<commit_message>
added images, has to be cleaned up
</commit_message>
<xml_diff>
--- a/Agile.net/AgileTOC.pptx
+++ b/Agile.net/AgileTOC.pptx
@@ -243,7 +243,7 @@
             <a:fld id="{C18D1C7F-F460-4900-8A7C-0D26CC5E5A28}" type="datetimeFigureOut">
               <a:rPr lang="en-US" smtClean="0"/>
               <a:pPr/>
-              <a:t>11/14/2008</a:t>
+              <a:t>11/16/2008</a:t>
             </a:fld>
             <a:endParaRPr lang="en-US"/>
           </a:p>
@@ -558,7 +558,7 @@
             <a:fld id="{C18D1C7F-F460-4900-8A7C-0D26CC5E5A28}" type="datetimeFigureOut">
               <a:rPr lang="en-US" smtClean="0"/>
               <a:pPr/>
-              <a:t>11/14/2008</a:t>
+              <a:t>11/16/2008</a:t>
             </a:fld>
             <a:endParaRPr lang="en-US"/>
           </a:p>
@@ -745,7 +745,7 @@
             <a:fld id="{C18D1C7F-F460-4900-8A7C-0D26CC5E5A28}" type="datetimeFigureOut">
               <a:rPr lang="en-US" smtClean="0"/>
               <a:pPr/>
-              <a:t>11/14/2008</a:t>
+              <a:t>11/16/2008</a:t>
             </a:fld>
             <a:endParaRPr lang="en-US"/>
           </a:p>
@@ -922,7 +922,7 @@
             <a:fld id="{C18D1C7F-F460-4900-8A7C-0D26CC5E5A28}" type="datetimeFigureOut">
               <a:rPr lang="en-US" smtClean="0"/>
               <a:pPr/>
-              <a:t>11/14/2008</a:t>
+              <a:t>11/16/2008</a:t>
             </a:fld>
             <a:endParaRPr lang="en-US"/>
           </a:p>
@@ -1192,7 +1192,7 @@
             <a:fld id="{C18D1C7F-F460-4900-8A7C-0D26CC5E5A28}" type="datetimeFigureOut">
               <a:rPr lang="en-US" smtClean="0"/>
               <a:pPr/>
-              <a:t>11/14/2008</a:t>
+              <a:t>11/16/2008</a:t>
             </a:fld>
             <a:endParaRPr lang="en-US"/>
           </a:p>
@@ -1662,7 +1662,7 @@
             <a:fld id="{C18D1C7F-F460-4900-8A7C-0D26CC5E5A28}" type="datetimeFigureOut">
               <a:rPr lang="en-US" smtClean="0"/>
               <a:pPr/>
-              <a:t>11/14/2008</a:t>
+              <a:t>11/16/2008</a:t>
             </a:fld>
             <a:endParaRPr lang="en-US"/>
           </a:p>
@@ -2153,7 +2153,7 @@
             <a:fld id="{C18D1C7F-F460-4900-8A7C-0D26CC5E5A28}" type="datetimeFigureOut">
               <a:rPr lang="en-US" smtClean="0"/>
               <a:pPr/>
-              <a:t>11/14/2008</a:t>
+              <a:t>11/16/2008</a:t>
             </a:fld>
             <a:endParaRPr lang="en-US"/>
           </a:p>
@@ -2281,7 +2281,7 @@
             <a:fld id="{C18D1C7F-F460-4900-8A7C-0D26CC5E5A28}" type="datetimeFigureOut">
               <a:rPr lang="en-US" smtClean="0"/>
               <a:pPr/>
-              <a:t>11/14/2008</a:t>
+              <a:t>11/16/2008</a:t>
             </a:fld>
             <a:endParaRPr lang="en-US"/>
           </a:p>
@@ -2427,7 +2427,7 @@
             <a:fld id="{C18D1C7F-F460-4900-8A7C-0D26CC5E5A28}" type="datetimeFigureOut">
               <a:rPr lang="en-US" smtClean="0"/>
               <a:pPr/>
-              <a:t>11/14/2008</a:t>
+              <a:t>11/16/2008</a:t>
             </a:fld>
             <a:endParaRPr lang="en-US"/>
           </a:p>
@@ -2751,7 +2751,7 @@
             <a:fld id="{C18D1C7F-F460-4900-8A7C-0D26CC5E5A28}" type="datetimeFigureOut">
               <a:rPr lang="en-US" smtClean="0"/>
               <a:pPr/>
-              <a:t>11/14/2008</a:t>
+              <a:t>11/16/2008</a:t>
             </a:fld>
             <a:endParaRPr lang="en-US"/>
           </a:p>
@@ -2887,7 +2887,7 @@
             <a:fld id="{C18D1C7F-F460-4900-8A7C-0D26CC5E5A28}" type="datetimeFigureOut">
               <a:rPr lang="en-US" smtClean="0"/>
               <a:pPr/>
-              <a:t>11/14/2008</a:t>
+              <a:t>11/16/2008</a:t>
             </a:fld>
             <a:endParaRPr lang="en-US"/>
           </a:p>
@@ -3670,7 +3670,7 @@
             <a:fld id="{C18D1C7F-F460-4900-8A7C-0D26CC5E5A28}" type="datetimeFigureOut">
               <a:rPr lang="en-US" smtClean="0"/>
               <a:pPr/>
-              <a:t>11/14/2008</a:t>
+              <a:t>11/16/2008</a:t>
             </a:fld>
             <a:endParaRPr lang="en-US"/>
           </a:p>
@@ -4207,11 +4207,7 @@
           <a:p>
             <a:r>
               <a:rPr lang="nl-BE" dirty="0" smtClean="0"/>
-              <a:t>Experiences of the </a:t>
-            </a:r>
-            <a:r>
-              <a:rPr lang="nl-BE" dirty="0" smtClean="0"/>
-              <a:t>Artilium</a:t>
+              <a:t>Experiences of the Artilium</a:t>
             </a:r>
             <a:r>
               <a:rPr lang="nl-BE" baseline="0" dirty="0" smtClean="0"/>
@@ -4403,6 +4399,133 @@
           </a:p>
         </p:txBody>
       </p:sp>
+      <p:pic>
+        <p:nvPicPr>
+          <p:cNvPr id="1026" name="Picture 2">
+            <a:hlinkClick r:id="rId2" action="ppaction://hlinkpres?slideindex=1&amp;slidetitle="/>
+          </p:cNvPr>
+          <p:cNvPicPr>
+            <a:picLocks noChangeAspect="1" noChangeArrowheads="1"/>
+          </p:cNvPicPr>
+          <p:nvPr/>
+        </p:nvPicPr>
+        <p:blipFill>
+          <a:blip r:embed="rId5" cstate="print"/>
+          <a:srcRect/>
+          <a:stretch>
+            <a:fillRect/>
+          </a:stretch>
+        </p:blipFill>
+        <p:spPr bwMode="auto">
+          <a:xfrm>
+            <a:off x="4071934" y="1142984"/>
+            <a:ext cx="2019108" cy="1514331"/>
+          </a:xfrm>
+          <a:prstGeom prst="rect">
+            <a:avLst/>
+          </a:prstGeom>
+          <a:noFill/>
+          <a:ln w="9525">
+            <a:noFill/>
+            <a:miter lim="800000"/>
+            <a:headEnd/>
+            <a:tailEnd/>
+          </a:ln>
+          <a:effectLst/>
+        </p:spPr>
+      </p:pic>
+      <p:pic>
+        <p:nvPicPr>
+          <p:cNvPr id="5" name="Picture 2">
+            <a:hlinkClick r:id="rId6" action="ppaction://hlinkpres?slideindex=1&amp;slidetitle="/>
+          </p:cNvPr>
+          <p:cNvPicPr>
+            <a:picLocks noChangeAspect="1" noChangeArrowheads="1"/>
+          </p:cNvPicPr>
+          <p:nvPr/>
+        </p:nvPicPr>
+        <p:blipFill>
+          <a:blip r:embed="rId7">
+            <a:clrChange>
+              <a:clrFrom>
+                <a:srgbClr val="FFFFFF"/>
+              </a:clrFrom>
+              <a:clrTo>
+                <a:srgbClr val="FFFFFF">
+                  <a:alpha val="0"/>
+                </a:srgbClr>
+              </a:clrTo>
+            </a:clrChange>
+          </a:blip>
+          <a:srcRect/>
+          <a:stretch>
+            <a:fillRect/>
+          </a:stretch>
+        </p:blipFill>
+        <p:spPr bwMode="auto">
+          <a:xfrm>
+            <a:off x="785786" y="4071942"/>
+            <a:ext cx="3843165" cy="1308506"/>
+          </a:xfrm>
+          <a:prstGeom prst="rect">
+            <a:avLst/>
+          </a:prstGeom>
+          <a:noFill/>
+          <a:ln w="9525">
+            <a:noFill/>
+            <a:miter lim="800000"/>
+            <a:headEnd/>
+            <a:tailEnd/>
+          </a:ln>
+          <a:effectLst/>
+        </p:spPr>
+      </p:pic>
+      <p:pic>
+        <p:nvPicPr>
+          <p:cNvPr id="1027" name="Picture 3">
+            <a:hlinkClick r:id="rId8" action="ppaction://hlinkpres?slideindex=1&amp;slidetitle="/>
+          </p:cNvPr>
+          <p:cNvPicPr>
+            <a:picLocks noChangeAspect="1" noChangeArrowheads="1"/>
+          </p:cNvPicPr>
+          <p:nvPr/>
+        </p:nvPicPr>
+        <p:blipFill>
+          <a:blip r:embed="rId9">
+            <a:clrChange>
+              <a:clrFrom>
+                <a:srgbClr val="FFFFFF"/>
+              </a:clrFrom>
+              <a:clrTo>
+                <a:srgbClr val="FFFFFF">
+                  <a:alpha val="0"/>
+                </a:srgbClr>
+              </a:clrTo>
+            </a:clrChange>
+          </a:blip>
+          <a:srcRect/>
+          <a:stretch>
+            <a:fillRect/>
+          </a:stretch>
+        </p:blipFill>
+        <p:spPr bwMode="auto">
+          <a:xfrm>
+            <a:off x="6429388" y="3286124"/>
+            <a:ext cx="1928816" cy="3124682"/>
+          </a:xfrm>
+          <a:prstGeom prst="rect">
+            <a:avLst/>
+          </a:prstGeom>
+          <a:noFill/>
+          <a:ln w="9525">
+            <a:noFill/>
+            <a:miter lim="800000"/>
+            <a:headEnd/>
+            <a:tailEnd/>
+          </a:ln>
+          <a:effectLst/>
+        </p:spPr>
+      </p:pic>
     </p:spTree>
   </p:cSld>
   <p:clrMapOvr>
@@ -4411,7 +4534,86 @@
   <p:timing>
     <p:tnLst>
       <p:par>
-        <p:cTn id="1" dur="indefinite" restart="never" nodeType="tmRoot"/>
+        <p:cTn id="1" dur="indefinite" restart="never" nodeType="tmRoot">
+          <p:childTnLst>
+            <p:seq concurrent="1" nextAc="seek">
+              <p:cTn id="2" dur="indefinite" nodeType="mainSeq">
+                <p:childTnLst>
+                  <p:par>
+                    <p:cTn id="3" fill="hold">
+                      <p:stCondLst>
+                        <p:cond delay="indefinite"/>
+                        <p:cond evt="onBegin" delay="0">
+                          <p:tn val="2"/>
+                        </p:cond>
+                      </p:stCondLst>
+                      <p:childTnLst>
+                        <p:par>
+                          <p:cTn id="4" fill="hold">
+                            <p:stCondLst>
+                              <p:cond delay="0"/>
+                            </p:stCondLst>
+                            <p:childTnLst>
+                              <p:par>
+                                <p:cTn id="5" presetID="10" presetClass="entr" presetSubtype="0" fill="hold" nodeType="withEffect">
+                                  <p:stCondLst>
+                                    <p:cond delay="0"/>
+                                  </p:stCondLst>
+                                  <p:childTnLst>
+                                    <p:set>
+                                      <p:cBhvr>
+                                        <p:cTn id="6" dur="1" fill="hold">
+                                          <p:stCondLst>
+                                            <p:cond delay="0"/>
+                                          </p:stCondLst>
+                                        </p:cTn>
+                                        <p:tgtEl>
+                                          <p:spTgt spid="5"/>
+                                        </p:tgtEl>
+                                        <p:attrNameLst>
+                                          <p:attrName>style.visibility</p:attrName>
+                                        </p:attrNameLst>
+                                      </p:cBhvr>
+                                      <p:to>
+                                        <p:strVal val="visible"/>
+                                      </p:to>
+                                    </p:set>
+                                    <p:animEffect transition="in" filter="fade">
+                                      <p:cBhvr>
+                                        <p:cTn id="7" dur="2000"/>
+                                        <p:tgtEl>
+                                          <p:spTgt spid="5"/>
+                                        </p:tgtEl>
+                                      </p:cBhvr>
+                                    </p:animEffect>
+                                  </p:childTnLst>
+                                </p:cTn>
+                              </p:par>
+                            </p:childTnLst>
+                          </p:cTn>
+                        </p:par>
+                      </p:childTnLst>
+                    </p:cTn>
+                  </p:par>
+                </p:childTnLst>
+              </p:cTn>
+              <p:prevCondLst>
+                <p:cond evt="onPrev" delay="0">
+                  <p:tgtEl>
+                    <p:sldTgt/>
+                  </p:tgtEl>
+                </p:cond>
+              </p:prevCondLst>
+              <p:nextCondLst>
+                <p:cond evt="onNext" delay="0">
+                  <p:tgtEl>
+                    <p:sldTgt/>
+                  </p:tgtEl>
+                </p:cond>
+              </p:nextCondLst>
+            </p:seq>
+          </p:childTnLst>
+        </p:cTn>
       </p:par>
     </p:tnLst>
   </p:timing>

</xml_diff>

<commit_message>
change to office2007 format
</commit_message>
<xml_diff>
--- a/Agile.net/AgileTOC.pptx
+++ b/Agile.net/AgileTOC.pptx
@@ -243,7 +243,7 @@
             <a:fld id="{C18D1C7F-F460-4900-8A7C-0D26CC5E5A28}" type="datetimeFigureOut">
               <a:rPr lang="en-US" smtClean="0"/>
               <a:pPr/>
-              <a:t>11/16/2008</a:t>
+              <a:t>11/17/2008</a:t>
             </a:fld>
             <a:endParaRPr lang="en-US"/>
           </a:p>
@@ -558,7 +558,7 @@
             <a:fld id="{C18D1C7F-F460-4900-8A7C-0D26CC5E5A28}" type="datetimeFigureOut">
               <a:rPr lang="en-US" smtClean="0"/>
               <a:pPr/>
-              <a:t>11/16/2008</a:t>
+              <a:t>11/17/2008</a:t>
             </a:fld>
             <a:endParaRPr lang="en-US"/>
           </a:p>
@@ -745,7 +745,7 @@
             <a:fld id="{C18D1C7F-F460-4900-8A7C-0D26CC5E5A28}" type="datetimeFigureOut">
               <a:rPr lang="en-US" smtClean="0"/>
               <a:pPr/>
-              <a:t>11/16/2008</a:t>
+              <a:t>11/17/2008</a:t>
             </a:fld>
             <a:endParaRPr lang="en-US"/>
           </a:p>
@@ -922,7 +922,7 @@
             <a:fld id="{C18D1C7F-F460-4900-8A7C-0D26CC5E5A28}" type="datetimeFigureOut">
               <a:rPr lang="en-US" smtClean="0"/>
               <a:pPr/>
-              <a:t>11/16/2008</a:t>
+              <a:t>11/17/2008</a:t>
             </a:fld>
             <a:endParaRPr lang="en-US"/>
           </a:p>
@@ -1192,7 +1192,7 @@
             <a:fld id="{C18D1C7F-F460-4900-8A7C-0D26CC5E5A28}" type="datetimeFigureOut">
               <a:rPr lang="en-US" smtClean="0"/>
               <a:pPr/>
-              <a:t>11/16/2008</a:t>
+              <a:t>11/17/2008</a:t>
             </a:fld>
             <a:endParaRPr lang="en-US"/>
           </a:p>
@@ -1662,7 +1662,7 @@
             <a:fld id="{C18D1C7F-F460-4900-8A7C-0D26CC5E5A28}" type="datetimeFigureOut">
               <a:rPr lang="en-US" smtClean="0"/>
               <a:pPr/>
-              <a:t>11/16/2008</a:t>
+              <a:t>11/17/2008</a:t>
             </a:fld>
             <a:endParaRPr lang="en-US"/>
           </a:p>
@@ -2153,7 +2153,7 @@
             <a:fld id="{C18D1C7F-F460-4900-8A7C-0D26CC5E5A28}" type="datetimeFigureOut">
               <a:rPr lang="en-US" smtClean="0"/>
               <a:pPr/>
-              <a:t>11/16/2008</a:t>
+              <a:t>11/17/2008</a:t>
             </a:fld>
             <a:endParaRPr lang="en-US"/>
           </a:p>
@@ -2281,7 +2281,7 @@
             <a:fld id="{C18D1C7F-F460-4900-8A7C-0D26CC5E5A28}" type="datetimeFigureOut">
               <a:rPr lang="en-US" smtClean="0"/>
               <a:pPr/>
-              <a:t>11/16/2008</a:t>
+              <a:t>11/17/2008</a:t>
             </a:fld>
             <a:endParaRPr lang="en-US"/>
           </a:p>
@@ -2427,7 +2427,7 @@
             <a:fld id="{C18D1C7F-F460-4900-8A7C-0D26CC5E5A28}" type="datetimeFigureOut">
               <a:rPr lang="en-US" smtClean="0"/>
               <a:pPr/>
-              <a:t>11/16/2008</a:t>
+              <a:t>11/17/2008</a:t>
             </a:fld>
             <a:endParaRPr lang="en-US"/>
           </a:p>
@@ -2751,7 +2751,7 @@
             <a:fld id="{C18D1C7F-F460-4900-8A7C-0D26CC5E5A28}" type="datetimeFigureOut">
               <a:rPr lang="en-US" smtClean="0"/>
               <a:pPr/>
-              <a:t>11/16/2008</a:t>
+              <a:t>11/17/2008</a:t>
             </a:fld>
             <a:endParaRPr lang="en-US"/>
           </a:p>
@@ -2887,7 +2887,7 @@
             <a:fld id="{C18D1C7F-F460-4900-8A7C-0D26CC5E5A28}" type="datetimeFigureOut">
               <a:rPr lang="en-US" smtClean="0"/>
               <a:pPr/>
-              <a:t>11/16/2008</a:t>
+              <a:t>11/17/2008</a:t>
             </a:fld>
             <a:endParaRPr lang="en-US"/>
           </a:p>
@@ -3670,7 +3670,7 @@
             <a:fld id="{C18D1C7F-F460-4900-8A7C-0D26CC5E5A28}" type="datetimeFigureOut">
               <a:rPr lang="en-US" smtClean="0"/>
               <a:pPr/>
-              <a:t>11/16/2008</a:t>
+              <a:t>11/17/2008</a:t>
             </a:fld>
             <a:endParaRPr lang="en-US"/>
           </a:p>
@@ -4347,11 +4347,6 @@
               </a:rPr>
               <a:t>... with Microsoft techonogies!</a:t>
             </a:r>
-            <a:endParaRPr lang="nl-BE" sz="2800" dirty="0" smtClean="0">
-              <a:solidFill>
-                <a:schemeClr val="tx1"/>
-              </a:solidFill>
-            </a:endParaRPr>
           </a:p>
         </p:txBody>
       </p:sp>
@@ -4394,29 +4389,8 @@
                   <a:schemeClr val="tx1"/>
                 </a:solidFill>
               </a:rPr>
-              <a:t>... </a:t>
-            </a:r>
-            <a:r>
-              <a:rPr lang="nl-BE" sz="2800" dirty="0" smtClean="0">
-                <a:solidFill>
-                  <a:schemeClr val="tx1"/>
-                </a:solidFill>
-              </a:rPr>
-              <a:t>applied on</a:t>
-            </a:r>
-            <a:r>
-              <a:rPr lang="nl-BE" sz="2800" dirty="0" smtClean="0">
-                <a:solidFill>
-                  <a:schemeClr val="tx1"/>
-                </a:solidFill>
-              </a:rPr>
-              <a:t>...</a:t>
-            </a:r>
-            <a:endParaRPr lang="nl-BE" sz="2800" dirty="0" smtClean="0">
-              <a:solidFill>
-                <a:schemeClr val="tx1"/>
-              </a:solidFill>
-            </a:endParaRPr>
+              <a:t>... applied on...</a:t>
+            </a:r>
           </a:p>
         </p:txBody>
       </p:sp>

</xml_diff>